<commit_message>
added tab for Mate and CA Tools
</commit_message>
<xml_diff>
--- a/resources/icons.pptx
+++ b/resources/icons.pptx
@@ -5,14 +5,16 @@
     <p:sldMasterId id="2147483684" r:id="rId1"/>
   </p:sldMasterIdLst>
   <p:notesMasterIdLst>
-    <p:notesMasterId r:id="rId7"/>
+    <p:notesMasterId r:id="rId9"/>
   </p:notesMasterIdLst>
   <p:sldIdLst>
     <p:sldId id="597" r:id="rId2"/>
     <p:sldId id="598" r:id="rId3"/>
-    <p:sldId id="388" r:id="rId4"/>
-    <p:sldId id="574" r:id="rId5"/>
-    <p:sldId id="575" r:id="rId6"/>
+    <p:sldId id="599" r:id="rId4"/>
+    <p:sldId id="600" r:id="rId5"/>
+    <p:sldId id="388" r:id="rId6"/>
+    <p:sldId id="574" r:id="rId7"/>
+    <p:sldId id="575" r:id="rId8"/>
   </p:sldIdLst>
   <p:sldSz cx="914400" cy="914400"/>
   <p:notesSz cx="6858000" cy="9144000"/>
@@ -201,7 +203,7 @@
           <a:p>
             <a:fld id="{173FD435-C119-4590-9D53-7CAF83F19020}" type="datetimeFigureOut">
               <a:rPr lang="en-US" smtClean="0"/>
-              <a:t>7/3/2019</a:t>
+              <a:t>7/4/2019</a:t>
             </a:fld>
             <a:endParaRPr lang="en-US"/>
           </a:p>
@@ -683,7 +685,7 @@
           <a:p>
             <a:fld id="{D296FE55-24A0-4405-87BA-F203EB2AA989}" type="datetimeFigureOut">
               <a:rPr lang="en-US" smtClean="0"/>
-              <a:t>7/3/2019</a:t>
+              <a:t>7/4/2019</a:t>
             </a:fld>
             <a:endParaRPr lang="en-US"/>
           </a:p>
@@ -853,7 +855,7 @@
           <a:p>
             <a:fld id="{D296FE55-24A0-4405-87BA-F203EB2AA989}" type="datetimeFigureOut">
               <a:rPr lang="en-US" smtClean="0"/>
-              <a:t>7/3/2019</a:t>
+              <a:t>7/4/2019</a:t>
             </a:fld>
             <a:endParaRPr lang="en-US"/>
           </a:p>
@@ -1033,7 +1035,7 @@
           <a:p>
             <a:fld id="{D296FE55-24A0-4405-87BA-F203EB2AA989}" type="datetimeFigureOut">
               <a:rPr lang="en-US" smtClean="0"/>
-              <a:t>7/3/2019</a:t>
+              <a:t>7/4/2019</a:t>
             </a:fld>
             <a:endParaRPr lang="en-US"/>
           </a:p>
@@ -1203,7 +1205,7 @@
           <a:p>
             <a:fld id="{D296FE55-24A0-4405-87BA-F203EB2AA989}" type="datetimeFigureOut">
               <a:rPr lang="en-US" smtClean="0"/>
-              <a:t>7/3/2019</a:t>
+              <a:t>7/4/2019</a:t>
             </a:fld>
             <a:endParaRPr lang="en-US"/>
           </a:p>
@@ -1447,7 +1449,7 @@
           <a:p>
             <a:fld id="{D296FE55-24A0-4405-87BA-F203EB2AA989}" type="datetimeFigureOut">
               <a:rPr lang="en-US" smtClean="0"/>
-              <a:t>7/3/2019</a:t>
+              <a:t>7/4/2019</a:t>
             </a:fld>
             <a:endParaRPr lang="en-US"/>
           </a:p>
@@ -1679,7 +1681,7 @@
           <a:p>
             <a:fld id="{D296FE55-24A0-4405-87BA-F203EB2AA989}" type="datetimeFigureOut">
               <a:rPr lang="en-US" smtClean="0"/>
-              <a:t>7/3/2019</a:t>
+              <a:t>7/4/2019</a:t>
             </a:fld>
             <a:endParaRPr lang="en-US"/>
           </a:p>
@@ -2046,7 +2048,7 @@
           <a:p>
             <a:fld id="{D296FE55-24A0-4405-87BA-F203EB2AA989}" type="datetimeFigureOut">
               <a:rPr lang="en-US" smtClean="0"/>
-              <a:t>7/3/2019</a:t>
+              <a:t>7/4/2019</a:t>
             </a:fld>
             <a:endParaRPr lang="en-US"/>
           </a:p>
@@ -2164,7 +2166,7 @@
           <a:p>
             <a:fld id="{D296FE55-24A0-4405-87BA-F203EB2AA989}" type="datetimeFigureOut">
               <a:rPr lang="en-US" smtClean="0"/>
-              <a:t>7/3/2019</a:t>
+              <a:t>7/4/2019</a:t>
             </a:fld>
             <a:endParaRPr lang="en-US"/>
           </a:p>
@@ -2259,7 +2261,7 @@
           <a:p>
             <a:fld id="{D296FE55-24A0-4405-87BA-F203EB2AA989}" type="datetimeFigureOut">
               <a:rPr lang="en-US" smtClean="0"/>
-              <a:t>7/3/2019</a:t>
+              <a:t>7/4/2019</a:t>
             </a:fld>
             <a:endParaRPr lang="en-US"/>
           </a:p>
@@ -2536,7 +2538,7 @@
           <a:p>
             <a:fld id="{D296FE55-24A0-4405-87BA-F203EB2AA989}" type="datetimeFigureOut">
               <a:rPr lang="en-US" smtClean="0"/>
-              <a:t>7/3/2019</a:t>
+              <a:t>7/4/2019</a:t>
             </a:fld>
             <a:endParaRPr lang="en-US"/>
           </a:p>
@@ -2793,7 +2795,7 @@
           <a:p>
             <a:fld id="{D296FE55-24A0-4405-87BA-F203EB2AA989}" type="datetimeFigureOut">
               <a:rPr lang="en-US" smtClean="0"/>
-              <a:t>7/3/2019</a:t>
+              <a:t>7/4/2019</a:t>
             </a:fld>
             <a:endParaRPr lang="en-US"/>
           </a:p>
@@ -3006,7 +3008,7 @@
           <a:p>
             <a:fld id="{D296FE55-24A0-4405-87BA-F203EB2AA989}" type="datetimeFigureOut">
               <a:rPr lang="en-US" smtClean="0"/>
-              <a:t>7/3/2019</a:t>
+              <a:t>7/4/2019</a:t>
             </a:fld>
             <a:endParaRPr lang="en-US"/>
           </a:p>
@@ -3814,114 +3816,135 @@
           </a:prstGeom>
         </p:spPr>
       </p:pic>
-      <p:sp>
-        <p:nvSpPr>
-          <p:cNvPr id="7" name="Trapezoid 6">
+      <p:grpSp>
+        <p:nvGrpSpPr>
+          <p:cNvPr id="5" name="Group 4">
             <a:extLst>
               <a:ext uri="{FF2B5EF4-FFF2-40B4-BE49-F238E27FC236}">
-                <a16:creationId xmlns:a16="http://schemas.microsoft.com/office/drawing/2014/main" id="{3A87E2C4-FF18-4023-B8A9-DF28CE5FF3CE}"/>
+                <a16:creationId xmlns:a16="http://schemas.microsoft.com/office/drawing/2014/main" id="{57ED5742-F586-48C0-A0BB-11E59A1E051C}"/>
               </a:ext>
             </a:extLst>
           </p:cNvPr>
-          <p:cNvSpPr/>
+          <p:cNvGrpSpPr/>
           <p:nvPr/>
-        </p:nvSpPr>
-        <p:spPr>
-          <a:xfrm rot="19405270">
+        </p:nvGrpSpPr>
+        <p:grpSpPr>
+          <a:xfrm>
             <a:off x="296541" y="581564"/>
-            <a:ext cx="96715" cy="226340"/>
+            <a:ext cx="493564" cy="226340"/>
+            <a:chOff x="296541" y="581564"/>
+            <a:chExt cx="493564" cy="226340"/>
           </a:xfrm>
-          <a:prstGeom prst="trapezoid">
-            <a:avLst>
-              <a:gd name="adj" fmla="val 28297"/>
-            </a:avLst>
-          </a:prstGeom>
-          <a:solidFill>
-            <a:schemeClr val="bg1"/>
-          </a:solidFill>
-          <a:ln>
-            <a:noFill/>
-          </a:ln>
-        </p:spPr>
-        <p:style>
-          <a:lnRef idx="2">
-            <a:schemeClr val="accent1">
-              <a:shade val="50000"/>
-            </a:schemeClr>
-          </a:lnRef>
-          <a:fillRef idx="1">
-            <a:schemeClr val="accent1"/>
-          </a:fillRef>
-          <a:effectRef idx="0">
-            <a:schemeClr val="accent1"/>
-          </a:effectRef>
-          <a:fontRef idx="minor">
-            <a:schemeClr val="lt1"/>
-          </a:fontRef>
-        </p:style>
-        <p:txBody>
-          <a:bodyPr rtlCol="0" anchor="ctr"/>
-          <a:lstStyle/>
-          <a:p>
-            <a:pPr algn="ctr"/>
-            <a:endParaRPr lang="en-US" dirty="0"/>
-          </a:p>
-        </p:txBody>
-      </p:sp>
-      <p:sp>
-        <p:nvSpPr>
-          <p:cNvPr id="8" name="Trapezoid 7">
-            <a:extLst>
-              <a:ext uri="{FF2B5EF4-FFF2-40B4-BE49-F238E27FC236}">
-                <a16:creationId xmlns:a16="http://schemas.microsoft.com/office/drawing/2014/main" id="{F283EAEA-4516-4066-838C-8C818E8791BE}"/>
-              </a:ext>
-            </a:extLst>
-          </p:cNvPr>
-          <p:cNvSpPr/>
-          <p:nvPr/>
-        </p:nvSpPr>
-        <p:spPr>
-          <a:xfrm rot="3525951">
-            <a:off x="504913" y="447451"/>
-            <a:ext cx="110165" cy="460218"/>
-          </a:xfrm>
-          <a:prstGeom prst="trapezoid">
-            <a:avLst>
-              <a:gd name="adj" fmla="val 34263"/>
-            </a:avLst>
-          </a:prstGeom>
-          <a:solidFill>
-            <a:schemeClr val="bg1"/>
-          </a:solidFill>
-          <a:ln>
-            <a:noFill/>
-          </a:ln>
-        </p:spPr>
-        <p:style>
-          <a:lnRef idx="2">
-            <a:schemeClr val="accent1">
-              <a:shade val="50000"/>
-            </a:schemeClr>
-          </a:lnRef>
-          <a:fillRef idx="1">
-            <a:schemeClr val="accent1"/>
-          </a:fillRef>
-          <a:effectRef idx="0">
-            <a:schemeClr val="accent1"/>
-          </a:effectRef>
-          <a:fontRef idx="minor">
-            <a:schemeClr val="lt1"/>
-          </a:fontRef>
-        </p:style>
-        <p:txBody>
-          <a:bodyPr rtlCol="0" anchor="ctr"/>
-          <a:lstStyle/>
-          <a:p>
-            <a:pPr algn="ctr"/>
-            <a:endParaRPr lang="en-US"/>
-          </a:p>
-        </p:txBody>
-      </p:sp>
+        </p:grpSpPr>
+        <p:sp>
+          <p:nvSpPr>
+            <p:cNvPr id="7" name="Trapezoid 6">
+              <a:extLst>
+                <a:ext uri="{FF2B5EF4-FFF2-40B4-BE49-F238E27FC236}">
+                  <a16:creationId xmlns:a16="http://schemas.microsoft.com/office/drawing/2014/main" id="{3A87E2C4-FF18-4023-B8A9-DF28CE5FF3CE}"/>
+                </a:ext>
+              </a:extLst>
+            </p:cNvPr>
+            <p:cNvSpPr/>
+            <p:nvPr/>
+          </p:nvSpPr>
+          <p:spPr>
+            <a:xfrm rot="19405270">
+              <a:off x="296541" y="581564"/>
+              <a:ext cx="96715" cy="226340"/>
+            </a:xfrm>
+            <a:prstGeom prst="trapezoid">
+              <a:avLst>
+                <a:gd name="adj" fmla="val 28297"/>
+              </a:avLst>
+            </a:prstGeom>
+            <a:solidFill>
+              <a:schemeClr val="bg1"/>
+            </a:solidFill>
+            <a:ln>
+              <a:noFill/>
+            </a:ln>
+          </p:spPr>
+          <p:style>
+            <a:lnRef idx="2">
+              <a:schemeClr val="accent1">
+                <a:shade val="50000"/>
+              </a:schemeClr>
+            </a:lnRef>
+            <a:fillRef idx="1">
+              <a:schemeClr val="accent1"/>
+            </a:fillRef>
+            <a:effectRef idx="0">
+              <a:schemeClr val="accent1"/>
+            </a:effectRef>
+            <a:fontRef idx="minor">
+              <a:schemeClr val="lt1"/>
+            </a:fontRef>
+          </p:style>
+          <p:txBody>
+            <a:bodyPr rtlCol="0" anchor="ctr"/>
+            <a:lstStyle/>
+            <a:p>
+              <a:pPr algn="ctr"/>
+              <a:endParaRPr lang="en-US" dirty="0"/>
+            </a:p>
+          </p:txBody>
+        </p:sp>
+        <p:sp>
+          <p:nvSpPr>
+            <p:cNvPr id="8" name="Trapezoid 7">
+              <a:extLst>
+                <a:ext uri="{FF2B5EF4-FFF2-40B4-BE49-F238E27FC236}">
+                  <a16:creationId xmlns:a16="http://schemas.microsoft.com/office/drawing/2014/main" id="{F283EAEA-4516-4066-838C-8C818E8791BE}"/>
+                </a:ext>
+              </a:extLst>
+            </p:cNvPr>
+            <p:cNvSpPr/>
+            <p:nvPr/>
+          </p:nvSpPr>
+          <p:spPr>
+            <a:xfrm rot="3525951">
+              <a:off x="504913" y="447451"/>
+              <a:ext cx="110165" cy="460218"/>
+            </a:xfrm>
+            <a:prstGeom prst="trapezoid">
+              <a:avLst>
+                <a:gd name="adj" fmla="val 34263"/>
+              </a:avLst>
+            </a:prstGeom>
+            <a:solidFill>
+              <a:schemeClr val="bg1"/>
+            </a:solidFill>
+            <a:ln>
+              <a:noFill/>
+            </a:ln>
+          </p:spPr>
+          <p:style>
+            <a:lnRef idx="2">
+              <a:schemeClr val="accent1">
+                <a:shade val="50000"/>
+              </a:schemeClr>
+            </a:lnRef>
+            <a:fillRef idx="1">
+              <a:schemeClr val="accent1"/>
+            </a:fillRef>
+            <a:effectRef idx="0">
+              <a:schemeClr val="accent1"/>
+            </a:effectRef>
+            <a:fontRef idx="minor">
+              <a:schemeClr val="lt1"/>
+            </a:fontRef>
+          </p:style>
+          <p:txBody>
+            <a:bodyPr rtlCol="0" anchor="ctr"/>
+            <a:lstStyle/>
+            <a:p>
+              <a:pPr algn="ctr"/>
+              <a:endParaRPr lang="en-US"/>
+            </a:p>
+          </p:txBody>
+        </p:sp>
+      </p:grpSp>
     </p:spTree>
     <p:extLst>
       <p:ext uri="{BB962C8B-B14F-4D97-AF65-F5344CB8AC3E}">
@@ -3936,6 +3959,408 @@
 </file>
 
 <file path=ppt/slides/slide3.xml><?xml version="1.0" encoding="utf-8"?>
+<p:sld xmlns:a="http://schemas.openxmlformats.org/drawingml/2006/main" xmlns:r="http://schemas.openxmlformats.org/officeDocument/2006/relationships" xmlns:p="http://schemas.openxmlformats.org/presentationml/2006/main">
+  <p:cSld>
+    <p:spTree>
+      <p:nvGrpSpPr>
+        <p:cNvPr id="1" name=""/>
+        <p:cNvGrpSpPr/>
+        <p:nvPr/>
+      </p:nvGrpSpPr>
+      <p:grpSpPr>
+        <a:xfrm>
+          <a:off x="0" y="0"/>
+          <a:ext cx="0" cy="0"/>
+          <a:chOff x="0" y="0"/>
+          <a:chExt cx="0" cy="0"/>
+        </a:xfrm>
+      </p:grpSpPr>
+      <p:pic>
+        <p:nvPicPr>
+          <p:cNvPr id="5" name="Picture 4">
+            <a:extLst>
+              <a:ext uri="{FF2B5EF4-FFF2-40B4-BE49-F238E27FC236}">
+                <a16:creationId xmlns:a16="http://schemas.microsoft.com/office/drawing/2014/main" id="{FE242C83-77BC-47F8-881F-5767532741A0}"/>
+              </a:ext>
+            </a:extLst>
+          </p:cNvPr>
+          <p:cNvPicPr>
+            <a:picLocks noChangeAspect="1"/>
+          </p:cNvPicPr>
+          <p:nvPr/>
+        </p:nvPicPr>
+        <p:blipFill>
+          <a:blip r:embed="rId2" cstate="print">
+            <a:extLst>
+              <a:ext uri="{28A0092B-C50C-407E-A947-70E740481C1C}">
+                <a14:useLocalDpi xmlns:a14="http://schemas.microsoft.com/office/drawing/2010/main" val="0"/>
+              </a:ext>
+            </a:extLst>
+          </a:blip>
+          <a:stretch>
+            <a:fillRect/>
+          </a:stretch>
+        </p:blipFill>
+        <p:spPr>
+          <a:xfrm>
+            <a:off x="45720" y="45720"/>
+            <a:ext cx="822960" cy="822960"/>
+          </a:xfrm>
+          <a:prstGeom prst="rect">
+            <a:avLst/>
+          </a:prstGeom>
+          <a:effectLst>
+            <a:innerShdw blurRad="63500" dist="50800" dir="2700000">
+              <a:prstClr val="black">
+                <a:alpha val="50000"/>
+              </a:prstClr>
+            </a:innerShdw>
+          </a:effectLst>
+        </p:spPr>
+      </p:pic>
+      <p:sp>
+        <p:nvSpPr>
+          <p:cNvPr id="6" name="Block Arc 5">
+            <a:extLst>
+              <a:ext uri="{FF2B5EF4-FFF2-40B4-BE49-F238E27FC236}">
+                <a16:creationId xmlns:a16="http://schemas.microsoft.com/office/drawing/2014/main" id="{75892D25-2CFA-4B3C-A800-BB99E4BD2168}"/>
+              </a:ext>
+            </a:extLst>
+          </p:cNvPr>
+          <p:cNvSpPr>
+            <a:spLocks noChangeAspect="1"/>
+          </p:cNvSpPr>
+          <p:nvPr/>
+        </p:nvSpPr>
+        <p:spPr>
+          <a:xfrm rot="19537613">
+            <a:off x="319273" y="426300"/>
+            <a:ext cx="137160" cy="137160"/>
+          </a:xfrm>
+          <a:prstGeom prst="blockArc">
+            <a:avLst/>
+          </a:prstGeom>
+          <a:solidFill>
+            <a:schemeClr val="accent4"/>
+          </a:solidFill>
+          <a:ln>
+            <a:noFill/>
+          </a:ln>
+          <a:effectLst>
+            <a:innerShdw blurRad="63500" dist="50800" dir="2700000">
+              <a:prstClr val="black">
+                <a:alpha val="50000"/>
+              </a:prstClr>
+            </a:innerShdw>
+          </a:effectLst>
+        </p:spPr>
+        <p:style>
+          <a:lnRef idx="0">
+            <a:scrgbClr r="0" g="0" b="0"/>
+          </a:lnRef>
+          <a:fillRef idx="0">
+            <a:scrgbClr r="0" g="0" b="0"/>
+          </a:fillRef>
+          <a:effectRef idx="0">
+            <a:scrgbClr r="0" g="0" b="0"/>
+          </a:effectRef>
+          <a:fontRef idx="minor">
+            <a:schemeClr val="lt1"/>
+          </a:fontRef>
+        </p:style>
+        <p:txBody>
+          <a:bodyPr rtlCol="0" anchor="ctr"/>
+          <a:lstStyle/>
+          <a:p>
+            <a:pPr algn="ctr"/>
+            <a:endParaRPr lang="en-US">
+              <a:solidFill>
+                <a:schemeClr val="tx1"/>
+              </a:solidFill>
+            </a:endParaRPr>
+          </a:p>
+        </p:txBody>
+      </p:sp>
+      <p:sp>
+        <p:nvSpPr>
+          <p:cNvPr id="8" name="Block Arc 7">
+            <a:extLst>
+              <a:ext uri="{FF2B5EF4-FFF2-40B4-BE49-F238E27FC236}">
+                <a16:creationId xmlns:a16="http://schemas.microsoft.com/office/drawing/2014/main" id="{1F2B1A0A-36EF-486F-8C89-420E67047745}"/>
+              </a:ext>
+            </a:extLst>
+          </p:cNvPr>
+          <p:cNvSpPr>
+            <a:spLocks noChangeAspect="1"/>
+          </p:cNvSpPr>
+          <p:nvPr/>
+        </p:nvSpPr>
+        <p:spPr>
+          <a:xfrm rot="2062387" flipH="1">
+            <a:off x="454204" y="426300"/>
+            <a:ext cx="137160" cy="137160"/>
+          </a:xfrm>
+          <a:prstGeom prst="blockArc">
+            <a:avLst/>
+          </a:prstGeom>
+          <a:solidFill>
+            <a:schemeClr val="accent4"/>
+          </a:solidFill>
+          <a:ln>
+            <a:noFill/>
+          </a:ln>
+          <a:effectLst>
+            <a:innerShdw blurRad="63500" dist="50800" dir="2700000">
+              <a:prstClr val="black">
+                <a:alpha val="50000"/>
+              </a:prstClr>
+            </a:innerShdw>
+          </a:effectLst>
+        </p:spPr>
+        <p:style>
+          <a:lnRef idx="0">
+            <a:scrgbClr r="0" g="0" b="0"/>
+          </a:lnRef>
+          <a:fillRef idx="0">
+            <a:scrgbClr r="0" g="0" b="0"/>
+          </a:fillRef>
+          <a:effectRef idx="0">
+            <a:scrgbClr r="0" g="0" b="0"/>
+          </a:effectRef>
+          <a:fontRef idx="minor">
+            <a:schemeClr val="lt1"/>
+          </a:fontRef>
+        </p:style>
+        <p:txBody>
+          <a:bodyPr rtlCol="0" anchor="ctr"/>
+          <a:lstStyle/>
+          <a:p>
+            <a:pPr algn="ctr"/>
+            <a:endParaRPr lang="en-US">
+              <a:solidFill>
+                <a:schemeClr val="tx1"/>
+              </a:solidFill>
+            </a:endParaRPr>
+          </a:p>
+        </p:txBody>
+      </p:sp>
+    </p:spTree>
+    <p:extLst>
+      <p:ext uri="{BB962C8B-B14F-4D97-AF65-F5344CB8AC3E}">
+        <p14:creationId xmlns:p14="http://schemas.microsoft.com/office/powerpoint/2010/main" val="3423500553"/>
+      </p:ext>
+    </p:extLst>
+  </p:cSld>
+  <p:clrMapOvr>
+    <a:masterClrMapping/>
+  </p:clrMapOvr>
+</p:sld>
+</file>
+
+<file path=ppt/slides/slide4.xml><?xml version="1.0" encoding="utf-8"?>
+<p:sld xmlns:a="http://schemas.openxmlformats.org/drawingml/2006/main" xmlns:r="http://schemas.openxmlformats.org/officeDocument/2006/relationships" xmlns:p="http://schemas.openxmlformats.org/presentationml/2006/main">
+  <p:cSld>
+    <p:spTree>
+      <p:nvGrpSpPr>
+        <p:cNvPr id="1" name=""/>
+        <p:cNvGrpSpPr/>
+        <p:nvPr/>
+      </p:nvGrpSpPr>
+      <p:grpSpPr>
+        <a:xfrm>
+          <a:off x="0" y="0"/>
+          <a:ext cx="0" cy="0"/>
+          <a:chOff x="0" y="0"/>
+          <a:chExt cx="0" cy="0"/>
+        </a:xfrm>
+      </p:grpSpPr>
+      <p:pic>
+        <p:nvPicPr>
+          <p:cNvPr id="3" name="Picture 2">
+            <a:extLst>
+              <a:ext uri="{FF2B5EF4-FFF2-40B4-BE49-F238E27FC236}">
+                <a16:creationId xmlns:a16="http://schemas.microsoft.com/office/drawing/2014/main" id="{219BFD42-347F-4F5D-8CD9-D851749A4AA6}"/>
+              </a:ext>
+            </a:extLst>
+          </p:cNvPr>
+          <p:cNvPicPr>
+            <a:picLocks noChangeAspect="1"/>
+          </p:cNvPicPr>
+          <p:nvPr/>
+        </p:nvPicPr>
+        <p:blipFill>
+          <a:blip r:embed="rId2" cstate="print">
+            <a:extLst>
+              <a:ext uri="{28A0092B-C50C-407E-A947-70E740481C1C}">
+                <a14:useLocalDpi xmlns:a14="http://schemas.microsoft.com/office/drawing/2010/main" val="0"/>
+              </a:ext>
+            </a:extLst>
+          </a:blip>
+          <a:stretch>
+            <a:fillRect/>
+          </a:stretch>
+        </p:blipFill>
+        <p:spPr>
+          <a:xfrm rot="21371430">
+            <a:off x="-2442" y="7378"/>
+            <a:ext cx="928533" cy="916071"/>
+          </a:xfrm>
+          <a:prstGeom prst="rect">
+            <a:avLst/>
+          </a:prstGeom>
+          <a:effectLst>
+            <a:innerShdw blurRad="63500" dist="50800">
+              <a:prstClr val="black">
+                <a:alpha val="50000"/>
+              </a:prstClr>
+            </a:innerShdw>
+          </a:effectLst>
+        </p:spPr>
+      </p:pic>
+      <p:grpSp>
+        <p:nvGrpSpPr>
+          <p:cNvPr id="7" name="Group 6">
+            <a:extLst>
+              <a:ext uri="{FF2B5EF4-FFF2-40B4-BE49-F238E27FC236}">
+                <a16:creationId xmlns:a16="http://schemas.microsoft.com/office/drawing/2014/main" id="{82A28B5B-FB8D-4C31-80C2-5AF65313DE78}"/>
+              </a:ext>
+            </a:extLst>
+          </p:cNvPr>
+          <p:cNvGrpSpPr>
+            <a:grpSpLocks noChangeAspect="1"/>
+          </p:cNvGrpSpPr>
+          <p:nvPr/>
+        </p:nvGrpSpPr>
+        <p:grpSpPr>
+          <a:xfrm>
+            <a:off x="311150" y="274643"/>
+            <a:ext cx="351004" cy="219075"/>
+            <a:chOff x="296541" y="581564"/>
+            <a:chExt cx="493564" cy="226340"/>
+          </a:xfrm>
+          <a:solidFill>
+            <a:schemeClr val="bg1"/>
+          </a:solidFill>
+        </p:grpSpPr>
+        <p:sp>
+          <p:nvSpPr>
+            <p:cNvPr id="9" name="Trapezoid 8">
+              <a:extLst>
+                <a:ext uri="{FF2B5EF4-FFF2-40B4-BE49-F238E27FC236}">
+                  <a16:creationId xmlns:a16="http://schemas.microsoft.com/office/drawing/2014/main" id="{090B9DE2-EFEE-44C1-A9F6-E8F0B28781B7}"/>
+                </a:ext>
+              </a:extLst>
+            </p:cNvPr>
+            <p:cNvSpPr/>
+            <p:nvPr/>
+          </p:nvSpPr>
+          <p:spPr>
+            <a:xfrm rot="19405270">
+              <a:off x="296541" y="581564"/>
+              <a:ext cx="96715" cy="226340"/>
+            </a:xfrm>
+            <a:prstGeom prst="trapezoid">
+              <a:avLst>
+                <a:gd name="adj" fmla="val 28297"/>
+              </a:avLst>
+            </a:prstGeom>
+            <a:grpFill/>
+            <a:ln>
+              <a:noFill/>
+            </a:ln>
+          </p:spPr>
+          <p:style>
+            <a:lnRef idx="2">
+              <a:schemeClr val="accent1">
+                <a:shade val="50000"/>
+              </a:schemeClr>
+            </a:lnRef>
+            <a:fillRef idx="1">
+              <a:schemeClr val="accent1"/>
+            </a:fillRef>
+            <a:effectRef idx="0">
+              <a:schemeClr val="accent1"/>
+            </a:effectRef>
+            <a:fontRef idx="minor">
+              <a:schemeClr val="lt1"/>
+            </a:fontRef>
+          </p:style>
+          <p:txBody>
+            <a:bodyPr rtlCol="0" anchor="ctr"/>
+            <a:lstStyle/>
+            <a:p>
+              <a:pPr algn="ctr"/>
+              <a:endParaRPr lang="en-US" dirty="0"/>
+            </a:p>
+          </p:txBody>
+        </p:sp>
+        <p:sp>
+          <p:nvSpPr>
+            <p:cNvPr id="10" name="Trapezoid 9">
+              <a:extLst>
+                <a:ext uri="{FF2B5EF4-FFF2-40B4-BE49-F238E27FC236}">
+                  <a16:creationId xmlns:a16="http://schemas.microsoft.com/office/drawing/2014/main" id="{813BD152-0609-4DB2-8D57-048D8D2A2845}"/>
+                </a:ext>
+              </a:extLst>
+            </p:cNvPr>
+            <p:cNvSpPr/>
+            <p:nvPr/>
+          </p:nvSpPr>
+          <p:spPr>
+            <a:xfrm rot="3525951">
+              <a:off x="504913" y="447451"/>
+              <a:ext cx="110165" cy="460218"/>
+            </a:xfrm>
+            <a:prstGeom prst="trapezoid">
+              <a:avLst>
+                <a:gd name="adj" fmla="val 34263"/>
+              </a:avLst>
+            </a:prstGeom>
+            <a:grpFill/>
+            <a:ln>
+              <a:noFill/>
+            </a:ln>
+          </p:spPr>
+          <p:style>
+            <a:lnRef idx="2">
+              <a:schemeClr val="accent1">
+                <a:shade val="50000"/>
+              </a:schemeClr>
+            </a:lnRef>
+            <a:fillRef idx="1">
+              <a:schemeClr val="accent1"/>
+            </a:fillRef>
+            <a:effectRef idx="0">
+              <a:schemeClr val="accent1"/>
+            </a:effectRef>
+            <a:fontRef idx="minor">
+              <a:schemeClr val="lt1"/>
+            </a:fontRef>
+          </p:style>
+          <p:txBody>
+            <a:bodyPr rtlCol="0" anchor="ctr"/>
+            <a:lstStyle/>
+            <a:p>
+              <a:pPr algn="ctr"/>
+              <a:endParaRPr lang="en-US"/>
+            </a:p>
+          </p:txBody>
+        </p:sp>
+      </p:grpSp>
+    </p:spTree>
+    <p:extLst>
+      <p:ext uri="{BB962C8B-B14F-4D97-AF65-F5344CB8AC3E}">
+        <p14:creationId xmlns:p14="http://schemas.microsoft.com/office/powerpoint/2010/main" val="683853415"/>
+      </p:ext>
+    </p:extLst>
+  </p:cSld>
+  <p:clrMapOvr>
+    <a:masterClrMapping/>
+  </p:clrMapOvr>
+</p:sld>
+</file>
+
+<file path=ppt/slides/slide5.xml><?xml version="1.0" encoding="utf-8"?>
 <p:sld xmlns:a="http://schemas.openxmlformats.org/drawingml/2006/main" xmlns:r="http://schemas.openxmlformats.org/officeDocument/2006/relationships" xmlns:p="http://schemas.openxmlformats.org/presentationml/2006/main">
   <p:cSld>
     <p:spTree>
@@ -4056,7 +4481,7 @@
 </p:sld>
 </file>
 
-<file path=ppt/slides/slide4.xml><?xml version="1.0" encoding="utf-8"?>
+<file path=ppt/slides/slide6.xml><?xml version="1.0" encoding="utf-8"?>
 <p:sld xmlns:a="http://schemas.openxmlformats.org/drawingml/2006/main" xmlns:r="http://schemas.openxmlformats.org/officeDocument/2006/relationships" xmlns:p="http://schemas.openxmlformats.org/presentationml/2006/main">
   <p:cSld>
     <p:spTree>
@@ -4168,7 +4593,7 @@
 </p:sld>
 </file>
 
-<file path=ppt/slides/slide5.xml><?xml version="1.0" encoding="utf-8"?>
+<file path=ppt/slides/slide7.xml><?xml version="1.0" encoding="utf-8"?>
 <p:sld xmlns:a="http://schemas.openxmlformats.org/drawingml/2006/main" xmlns:r="http://schemas.openxmlformats.org/officeDocument/2006/relationships" xmlns:p="http://schemas.openxmlformats.org/presentationml/2006/main">
   <p:cSld>
     <p:spTree>

</xml_diff>

<commit_message>
changes to make input tab fully functional
</commit_message>
<xml_diff>
--- a/resources/icons.pptx
+++ b/resources/icons.pptx
@@ -5,7 +5,7 @@
     <p:sldMasterId id="2147483684" r:id="rId1"/>
   </p:sldMasterIdLst>
   <p:notesMasterIdLst>
-    <p:notesMasterId r:id="rId9"/>
+    <p:notesMasterId r:id="rId15"/>
   </p:notesMasterIdLst>
   <p:sldIdLst>
     <p:sldId id="597" r:id="rId2"/>
@@ -15,6 +15,12 @@
     <p:sldId id="388" r:id="rId6"/>
     <p:sldId id="574" r:id="rId7"/>
     <p:sldId id="575" r:id="rId8"/>
+    <p:sldId id="594" r:id="rId9"/>
+    <p:sldId id="603" r:id="rId10"/>
+    <p:sldId id="595" r:id="rId11"/>
+    <p:sldId id="601" r:id="rId12"/>
+    <p:sldId id="596" r:id="rId13"/>
+    <p:sldId id="602" r:id="rId14"/>
   </p:sldIdLst>
   <p:sldSz cx="914400" cy="914400"/>
   <p:notesSz cx="6858000" cy="9144000"/>
@@ -545,6 +551,510 @@
     <p:extLst>
       <p:ext uri="{BB962C8B-B14F-4D97-AF65-F5344CB8AC3E}">
         <p14:creationId xmlns:p14="http://schemas.microsoft.com/office/powerpoint/2010/main" val="571150195"/>
+      </p:ext>
+    </p:extLst>
+  </p:cSld>
+  <p:clrMapOvr>
+    <a:masterClrMapping/>
+  </p:clrMapOvr>
+</p:notes>
+</file>
+
+<file path=ppt/notesSlides/notesSlide2.xml><?xml version="1.0" encoding="utf-8"?>
+<p:notes xmlns:a="http://schemas.openxmlformats.org/drawingml/2006/main" xmlns:r="http://schemas.openxmlformats.org/officeDocument/2006/relationships" xmlns:p="http://schemas.openxmlformats.org/presentationml/2006/main">
+  <p:cSld>
+    <p:spTree>
+      <p:nvGrpSpPr>
+        <p:cNvPr id="1" name=""/>
+        <p:cNvGrpSpPr/>
+        <p:nvPr/>
+      </p:nvGrpSpPr>
+      <p:grpSpPr>
+        <a:xfrm>
+          <a:off x="0" y="0"/>
+          <a:ext cx="0" cy="0"/>
+          <a:chOff x="0" y="0"/>
+          <a:chExt cx="0" cy="0"/>
+        </a:xfrm>
+      </p:grpSpPr>
+      <p:sp>
+        <p:nvSpPr>
+          <p:cNvPr id="2" name="Slide Image Placeholder 1"/>
+          <p:cNvSpPr>
+            <a:spLocks noGrp="1" noRot="1" noChangeAspect="1"/>
+          </p:cNvSpPr>
+          <p:nvPr>
+            <p:ph type="sldImg"/>
+          </p:nvPr>
+        </p:nvSpPr>
+        <p:spPr/>
+      </p:sp>
+      <p:sp>
+        <p:nvSpPr>
+          <p:cNvPr id="3" name="Notes Placeholder 2"/>
+          <p:cNvSpPr>
+            <a:spLocks noGrp="1"/>
+          </p:cNvSpPr>
+          <p:nvPr>
+            <p:ph type="body" idx="1"/>
+          </p:nvPr>
+        </p:nvSpPr>
+        <p:spPr/>
+        <p:txBody>
+          <a:bodyPr/>
+          <a:lstStyle/>
+          <a:p>
+            <a:endParaRPr lang="en-US" dirty="0"/>
+          </a:p>
+        </p:txBody>
+      </p:sp>
+      <p:sp>
+        <p:nvSpPr>
+          <p:cNvPr id="4" name="Slide Number Placeholder 3"/>
+          <p:cNvSpPr>
+            <a:spLocks noGrp="1"/>
+          </p:cNvSpPr>
+          <p:nvPr>
+            <p:ph type="sldNum" sz="quarter" idx="5"/>
+          </p:nvPr>
+        </p:nvSpPr>
+        <p:spPr/>
+        <p:txBody>
+          <a:bodyPr/>
+          <a:lstStyle/>
+          <a:p>
+            <a:fld id="{EE6CE23A-BB01-46B4-BDD6-2DE3EFA83C70}" type="slidenum">
+              <a:rPr lang="en-US" smtClean="0"/>
+              <a:t>8</a:t>
+            </a:fld>
+            <a:endParaRPr lang="en-US"/>
+          </a:p>
+        </p:txBody>
+      </p:sp>
+    </p:spTree>
+    <p:extLst>
+      <p:ext uri="{BB962C8B-B14F-4D97-AF65-F5344CB8AC3E}">
+        <p14:creationId xmlns:p14="http://schemas.microsoft.com/office/powerpoint/2010/main" val="2478212806"/>
+      </p:ext>
+    </p:extLst>
+  </p:cSld>
+  <p:clrMapOvr>
+    <a:masterClrMapping/>
+  </p:clrMapOvr>
+</p:notes>
+</file>
+
+<file path=ppt/notesSlides/notesSlide3.xml><?xml version="1.0" encoding="utf-8"?>
+<p:notes xmlns:a="http://schemas.openxmlformats.org/drawingml/2006/main" xmlns:r="http://schemas.openxmlformats.org/officeDocument/2006/relationships" xmlns:p="http://schemas.openxmlformats.org/presentationml/2006/main">
+  <p:cSld>
+    <p:spTree>
+      <p:nvGrpSpPr>
+        <p:cNvPr id="1" name=""/>
+        <p:cNvGrpSpPr/>
+        <p:nvPr/>
+      </p:nvGrpSpPr>
+      <p:grpSpPr>
+        <a:xfrm>
+          <a:off x="0" y="0"/>
+          <a:ext cx="0" cy="0"/>
+          <a:chOff x="0" y="0"/>
+          <a:chExt cx="0" cy="0"/>
+        </a:xfrm>
+      </p:grpSpPr>
+      <p:sp>
+        <p:nvSpPr>
+          <p:cNvPr id="2" name="Slide Image Placeholder 1"/>
+          <p:cNvSpPr>
+            <a:spLocks noGrp="1" noRot="1" noChangeAspect="1"/>
+          </p:cNvSpPr>
+          <p:nvPr>
+            <p:ph type="sldImg"/>
+          </p:nvPr>
+        </p:nvSpPr>
+        <p:spPr/>
+      </p:sp>
+      <p:sp>
+        <p:nvSpPr>
+          <p:cNvPr id="3" name="Notes Placeholder 2"/>
+          <p:cNvSpPr>
+            <a:spLocks noGrp="1"/>
+          </p:cNvSpPr>
+          <p:nvPr>
+            <p:ph type="body" idx="1"/>
+          </p:nvPr>
+        </p:nvSpPr>
+        <p:spPr/>
+        <p:txBody>
+          <a:bodyPr/>
+          <a:lstStyle/>
+          <a:p>
+            <a:endParaRPr lang="en-US" dirty="0"/>
+          </a:p>
+        </p:txBody>
+      </p:sp>
+      <p:sp>
+        <p:nvSpPr>
+          <p:cNvPr id="4" name="Slide Number Placeholder 3"/>
+          <p:cNvSpPr>
+            <a:spLocks noGrp="1"/>
+          </p:cNvSpPr>
+          <p:nvPr>
+            <p:ph type="sldNum" sz="quarter" idx="5"/>
+          </p:nvPr>
+        </p:nvSpPr>
+        <p:spPr/>
+        <p:txBody>
+          <a:bodyPr/>
+          <a:lstStyle/>
+          <a:p>
+            <a:fld id="{EE6CE23A-BB01-46B4-BDD6-2DE3EFA83C70}" type="slidenum">
+              <a:rPr lang="en-US" smtClean="0"/>
+              <a:t>9</a:t>
+            </a:fld>
+            <a:endParaRPr lang="en-US"/>
+          </a:p>
+        </p:txBody>
+      </p:sp>
+    </p:spTree>
+    <p:extLst>
+      <p:ext uri="{BB962C8B-B14F-4D97-AF65-F5344CB8AC3E}">
+        <p14:creationId xmlns:p14="http://schemas.microsoft.com/office/powerpoint/2010/main" val="744257025"/>
+      </p:ext>
+    </p:extLst>
+  </p:cSld>
+  <p:clrMapOvr>
+    <a:masterClrMapping/>
+  </p:clrMapOvr>
+</p:notes>
+</file>
+
+<file path=ppt/notesSlides/notesSlide4.xml><?xml version="1.0" encoding="utf-8"?>
+<p:notes xmlns:a="http://schemas.openxmlformats.org/drawingml/2006/main" xmlns:r="http://schemas.openxmlformats.org/officeDocument/2006/relationships" xmlns:p="http://schemas.openxmlformats.org/presentationml/2006/main">
+  <p:cSld>
+    <p:spTree>
+      <p:nvGrpSpPr>
+        <p:cNvPr id="1" name=""/>
+        <p:cNvGrpSpPr/>
+        <p:nvPr/>
+      </p:nvGrpSpPr>
+      <p:grpSpPr>
+        <a:xfrm>
+          <a:off x="0" y="0"/>
+          <a:ext cx="0" cy="0"/>
+          <a:chOff x="0" y="0"/>
+          <a:chExt cx="0" cy="0"/>
+        </a:xfrm>
+      </p:grpSpPr>
+      <p:sp>
+        <p:nvSpPr>
+          <p:cNvPr id="2" name="Slide Image Placeholder 1"/>
+          <p:cNvSpPr>
+            <a:spLocks noGrp="1" noRot="1" noChangeAspect="1"/>
+          </p:cNvSpPr>
+          <p:nvPr>
+            <p:ph type="sldImg"/>
+          </p:nvPr>
+        </p:nvSpPr>
+        <p:spPr/>
+      </p:sp>
+      <p:sp>
+        <p:nvSpPr>
+          <p:cNvPr id="3" name="Notes Placeholder 2"/>
+          <p:cNvSpPr>
+            <a:spLocks noGrp="1"/>
+          </p:cNvSpPr>
+          <p:nvPr>
+            <p:ph type="body" idx="1"/>
+          </p:nvPr>
+        </p:nvSpPr>
+        <p:spPr/>
+        <p:txBody>
+          <a:bodyPr/>
+          <a:lstStyle/>
+          <a:p>
+            <a:endParaRPr lang="en-US" dirty="0"/>
+          </a:p>
+        </p:txBody>
+      </p:sp>
+      <p:sp>
+        <p:nvSpPr>
+          <p:cNvPr id="4" name="Slide Number Placeholder 3"/>
+          <p:cNvSpPr>
+            <a:spLocks noGrp="1"/>
+          </p:cNvSpPr>
+          <p:nvPr>
+            <p:ph type="sldNum" sz="quarter" idx="5"/>
+          </p:nvPr>
+        </p:nvSpPr>
+        <p:spPr/>
+        <p:txBody>
+          <a:bodyPr/>
+          <a:lstStyle/>
+          <a:p>
+            <a:fld id="{EE6CE23A-BB01-46B4-BDD6-2DE3EFA83C70}" type="slidenum">
+              <a:rPr lang="en-US" smtClean="0"/>
+              <a:t>10</a:t>
+            </a:fld>
+            <a:endParaRPr lang="en-US"/>
+          </a:p>
+        </p:txBody>
+      </p:sp>
+    </p:spTree>
+    <p:extLst>
+      <p:ext uri="{BB962C8B-B14F-4D97-AF65-F5344CB8AC3E}">
+        <p14:creationId xmlns:p14="http://schemas.microsoft.com/office/powerpoint/2010/main" val="642876963"/>
+      </p:ext>
+    </p:extLst>
+  </p:cSld>
+  <p:clrMapOvr>
+    <a:masterClrMapping/>
+  </p:clrMapOvr>
+</p:notes>
+</file>
+
+<file path=ppt/notesSlides/notesSlide5.xml><?xml version="1.0" encoding="utf-8"?>
+<p:notes xmlns:a="http://schemas.openxmlformats.org/drawingml/2006/main" xmlns:r="http://schemas.openxmlformats.org/officeDocument/2006/relationships" xmlns:p="http://schemas.openxmlformats.org/presentationml/2006/main">
+  <p:cSld>
+    <p:spTree>
+      <p:nvGrpSpPr>
+        <p:cNvPr id="1" name=""/>
+        <p:cNvGrpSpPr/>
+        <p:nvPr/>
+      </p:nvGrpSpPr>
+      <p:grpSpPr>
+        <a:xfrm>
+          <a:off x="0" y="0"/>
+          <a:ext cx="0" cy="0"/>
+          <a:chOff x="0" y="0"/>
+          <a:chExt cx="0" cy="0"/>
+        </a:xfrm>
+      </p:grpSpPr>
+      <p:sp>
+        <p:nvSpPr>
+          <p:cNvPr id="2" name="Slide Image Placeholder 1"/>
+          <p:cNvSpPr>
+            <a:spLocks noGrp="1" noRot="1" noChangeAspect="1"/>
+          </p:cNvSpPr>
+          <p:nvPr>
+            <p:ph type="sldImg"/>
+          </p:nvPr>
+        </p:nvSpPr>
+        <p:spPr/>
+      </p:sp>
+      <p:sp>
+        <p:nvSpPr>
+          <p:cNvPr id="3" name="Notes Placeholder 2"/>
+          <p:cNvSpPr>
+            <a:spLocks noGrp="1"/>
+          </p:cNvSpPr>
+          <p:nvPr>
+            <p:ph type="body" idx="1"/>
+          </p:nvPr>
+        </p:nvSpPr>
+        <p:spPr/>
+        <p:txBody>
+          <a:bodyPr/>
+          <a:lstStyle/>
+          <a:p>
+            <a:endParaRPr lang="en-US" dirty="0"/>
+          </a:p>
+        </p:txBody>
+      </p:sp>
+      <p:sp>
+        <p:nvSpPr>
+          <p:cNvPr id="4" name="Slide Number Placeholder 3"/>
+          <p:cNvSpPr>
+            <a:spLocks noGrp="1"/>
+          </p:cNvSpPr>
+          <p:nvPr>
+            <p:ph type="sldNum" sz="quarter" idx="5"/>
+          </p:nvPr>
+        </p:nvSpPr>
+        <p:spPr/>
+        <p:txBody>
+          <a:bodyPr/>
+          <a:lstStyle/>
+          <a:p>
+            <a:fld id="{EE6CE23A-BB01-46B4-BDD6-2DE3EFA83C70}" type="slidenum">
+              <a:rPr lang="en-US" smtClean="0"/>
+              <a:t>11</a:t>
+            </a:fld>
+            <a:endParaRPr lang="en-US"/>
+          </a:p>
+        </p:txBody>
+      </p:sp>
+    </p:spTree>
+    <p:extLst>
+      <p:ext uri="{BB962C8B-B14F-4D97-AF65-F5344CB8AC3E}">
+        <p14:creationId xmlns:p14="http://schemas.microsoft.com/office/powerpoint/2010/main" val="3934203879"/>
+      </p:ext>
+    </p:extLst>
+  </p:cSld>
+  <p:clrMapOvr>
+    <a:masterClrMapping/>
+  </p:clrMapOvr>
+</p:notes>
+</file>
+
+<file path=ppt/notesSlides/notesSlide6.xml><?xml version="1.0" encoding="utf-8"?>
+<p:notes xmlns:a="http://schemas.openxmlformats.org/drawingml/2006/main" xmlns:r="http://schemas.openxmlformats.org/officeDocument/2006/relationships" xmlns:p="http://schemas.openxmlformats.org/presentationml/2006/main">
+  <p:cSld>
+    <p:spTree>
+      <p:nvGrpSpPr>
+        <p:cNvPr id="1" name=""/>
+        <p:cNvGrpSpPr/>
+        <p:nvPr/>
+      </p:nvGrpSpPr>
+      <p:grpSpPr>
+        <a:xfrm>
+          <a:off x="0" y="0"/>
+          <a:ext cx="0" cy="0"/>
+          <a:chOff x="0" y="0"/>
+          <a:chExt cx="0" cy="0"/>
+        </a:xfrm>
+      </p:grpSpPr>
+      <p:sp>
+        <p:nvSpPr>
+          <p:cNvPr id="2" name="Slide Image Placeholder 1"/>
+          <p:cNvSpPr>
+            <a:spLocks noGrp="1" noRot="1" noChangeAspect="1"/>
+          </p:cNvSpPr>
+          <p:nvPr>
+            <p:ph type="sldImg"/>
+          </p:nvPr>
+        </p:nvSpPr>
+        <p:spPr/>
+      </p:sp>
+      <p:sp>
+        <p:nvSpPr>
+          <p:cNvPr id="3" name="Notes Placeholder 2"/>
+          <p:cNvSpPr>
+            <a:spLocks noGrp="1"/>
+          </p:cNvSpPr>
+          <p:nvPr>
+            <p:ph type="body" idx="1"/>
+          </p:nvPr>
+        </p:nvSpPr>
+        <p:spPr/>
+        <p:txBody>
+          <a:bodyPr/>
+          <a:lstStyle/>
+          <a:p>
+            <a:endParaRPr lang="en-US" dirty="0"/>
+          </a:p>
+        </p:txBody>
+      </p:sp>
+      <p:sp>
+        <p:nvSpPr>
+          <p:cNvPr id="4" name="Slide Number Placeholder 3"/>
+          <p:cNvSpPr>
+            <a:spLocks noGrp="1"/>
+          </p:cNvSpPr>
+          <p:nvPr>
+            <p:ph type="sldNum" sz="quarter" idx="5"/>
+          </p:nvPr>
+        </p:nvSpPr>
+        <p:spPr/>
+        <p:txBody>
+          <a:bodyPr/>
+          <a:lstStyle/>
+          <a:p>
+            <a:fld id="{EE6CE23A-BB01-46B4-BDD6-2DE3EFA83C70}" type="slidenum">
+              <a:rPr lang="en-US" smtClean="0"/>
+              <a:t>12</a:t>
+            </a:fld>
+            <a:endParaRPr lang="en-US"/>
+          </a:p>
+        </p:txBody>
+      </p:sp>
+    </p:spTree>
+    <p:extLst>
+      <p:ext uri="{BB962C8B-B14F-4D97-AF65-F5344CB8AC3E}">
+        <p14:creationId xmlns:p14="http://schemas.microsoft.com/office/powerpoint/2010/main" val="1118633931"/>
+      </p:ext>
+    </p:extLst>
+  </p:cSld>
+  <p:clrMapOvr>
+    <a:masterClrMapping/>
+  </p:clrMapOvr>
+</p:notes>
+</file>
+
+<file path=ppt/notesSlides/notesSlide7.xml><?xml version="1.0" encoding="utf-8"?>
+<p:notes xmlns:a="http://schemas.openxmlformats.org/drawingml/2006/main" xmlns:r="http://schemas.openxmlformats.org/officeDocument/2006/relationships" xmlns:p="http://schemas.openxmlformats.org/presentationml/2006/main">
+  <p:cSld>
+    <p:spTree>
+      <p:nvGrpSpPr>
+        <p:cNvPr id="1" name=""/>
+        <p:cNvGrpSpPr/>
+        <p:nvPr/>
+      </p:nvGrpSpPr>
+      <p:grpSpPr>
+        <a:xfrm>
+          <a:off x="0" y="0"/>
+          <a:ext cx="0" cy="0"/>
+          <a:chOff x="0" y="0"/>
+          <a:chExt cx="0" cy="0"/>
+        </a:xfrm>
+      </p:grpSpPr>
+      <p:sp>
+        <p:nvSpPr>
+          <p:cNvPr id="2" name="Slide Image Placeholder 1"/>
+          <p:cNvSpPr>
+            <a:spLocks noGrp="1" noRot="1" noChangeAspect="1"/>
+          </p:cNvSpPr>
+          <p:nvPr>
+            <p:ph type="sldImg"/>
+          </p:nvPr>
+        </p:nvSpPr>
+        <p:spPr/>
+      </p:sp>
+      <p:sp>
+        <p:nvSpPr>
+          <p:cNvPr id="3" name="Notes Placeholder 2"/>
+          <p:cNvSpPr>
+            <a:spLocks noGrp="1"/>
+          </p:cNvSpPr>
+          <p:nvPr>
+            <p:ph type="body" idx="1"/>
+          </p:nvPr>
+        </p:nvSpPr>
+        <p:spPr/>
+        <p:txBody>
+          <a:bodyPr/>
+          <a:lstStyle/>
+          <a:p>
+            <a:endParaRPr lang="en-US" dirty="0"/>
+          </a:p>
+        </p:txBody>
+      </p:sp>
+      <p:sp>
+        <p:nvSpPr>
+          <p:cNvPr id="4" name="Slide Number Placeholder 3"/>
+          <p:cNvSpPr>
+            <a:spLocks noGrp="1"/>
+          </p:cNvSpPr>
+          <p:nvPr>
+            <p:ph type="sldNum" sz="quarter" idx="5"/>
+          </p:nvPr>
+        </p:nvSpPr>
+        <p:spPr/>
+        <p:txBody>
+          <a:bodyPr/>
+          <a:lstStyle/>
+          <a:p>
+            <a:fld id="{EE6CE23A-BB01-46B4-BDD6-2DE3EFA83C70}" type="slidenum">
+              <a:rPr lang="en-US" smtClean="0"/>
+              <a:t>13</a:t>
+            </a:fld>
+            <a:endParaRPr lang="en-US"/>
+          </a:p>
+        </p:txBody>
+      </p:sp>
+    </p:spTree>
+    <p:extLst>
+      <p:ext uri="{BB962C8B-B14F-4D97-AF65-F5344CB8AC3E}">
+        <p14:creationId xmlns:p14="http://schemas.microsoft.com/office/powerpoint/2010/main" val="1993168581"/>
       </p:ext>
     </p:extLst>
   </p:cSld>
@@ -3728,6 +4238,358 @@
 </p:sld>
 </file>
 
+<file path=ppt/slides/slide10.xml><?xml version="1.0" encoding="utf-8"?>
+<p:sld xmlns:a="http://schemas.openxmlformats.org/drawingml/2006/main" xmlns:r="http://schemas.openxmlformats.org/officeDocument/2006/relationships" xmlns:p="http://schemas.openxmlformats.org/presentationml/2006/main">
+  <p:cSld>
+    <p:spTree>
+      <p:nvGrpSpPr>
+        <p:cNvPr id="1" name=""/>
+        <p:cNvGrpSpPr/>
+        <p:nvPr/>
+      </p:nvGrpSpPr>
+      <p:grpSpPr>
+        <a:xfrm>
+          <a:off x="0" y="0"/>
+          <a:ext cx="0" cy="0"/>
+          <a:chOff x="0" y="0"/>
+          <a:chExt cx="0" cy="0"/>
+        </a:xfrm>
+      </p:grpSpPr>
+      <p:sp>
+        <p:nvSpPr>
+          <p:cNvPr id="2" name="Rectangle 1">
+            <a:extLst>
+              <a:ext uri="{FF2B5EF4-FFF2-40B4-BE49-F238E27FC236}">
+                <a16:creationId xmlns:a16="http://schemas.microsoft.com/office/drawing/2014/main" id="{012911BF-0042-44E1-9319-FC58988C1E09}"/>
+              </a:ext>
+            </a:extLst>
+          </p:cNvPr>
+          <p:cNvSpPr/>
+          <p:nvPr/>
+        </p:nvSpPr>
+        <p:spPr>
+          <a:xfrm>
+            <a:off x="-14535" y="193025"/>
+            <a:ext cx="943470" cy="528478"/>
+          </a:xfrm>
+          <a:prstGeom prst="rect">
+            <a:avLst/>
+          </a:prstGeom>
+          <a:noFill/>
+          <a:effectLst/>
+        </p:spPr>
+        <p:txBody>
+          <a:bodyPr wrap="square" lIns="15240" tIns="7620" rIns="15240" bIns="7620">
+            <a:spAutoFit/>
+            <a:scene3d>
+              <a:camera prst="orthographicFront"/>
+              <a:lightRig rig="harsh" dir="t"/>
+            </a:scene3d>
+            <a:sp3d prstMaterial="matte">
+              <a:contourClr>
+                <a:schemeClr val="bg1">
+                  <a:lumMod val="65000"/>
+                </a:schemeClr>
+              </a:contourClr>
+            </a:sp3d>
+          </a:bodyPr>
+          <a:lstStyle/>
+          <a:p>
+            <a:pPr algn="ctr"/>
+            <a:r>
+              <a:rPr lang="en-US" sz="3334" b="1" spc="-42" dirty="0">
+                <a:ln/>
+                <a:solidFill>
+                  <a:schemeClr val="accent1">
+                    <a:lumMod val="50000"/>
+                  </a:schemeClr>
+                </a:solidFill>
+                <a:latin typeface="Bitstream Vera Sans Mono" panose="020B0609030804020204" pitchFamily="49" charset="0"/>
+                <a:ea typeface="DejaVu Sans" panose="020B0603030804020204" pitchFamily="34" charset="0"/>
+                <a:cs typeface="DejaVu Sans" panose="020B0603030804020204" pitchFamily="34" charset="0"/>
+              </a:rPr>
+              <a:t>BAG</a:t>
+            </a:r>
+          </a:p>
+        </p:txBody>
+      </p:sp>
+    </p:spTree>
+    <p:extLst>
+      <p:ext uri="{BB962C8B-B14F-4D97-AF65-F5344CB8AC3E}">
+        <p14:creationId xmlns:p14="http://schemas.microsoft.com/office/powerpoint/2010/main" val="3546066169"/>
+      </p:ext>
+    </p:extLst>
+  </p:cSld>
+  <p:clrMapOvr>
+    <a:masterClrMapping/>
+  </p:clrMapOvr>
+</p:sld>
+</file>
+
+<file path=ppt/slides/slide11.xml><?xml version="1.0" encoding="utf-8"?>
+<p:sld xmlns:a="http://schemas.openxmlformats.org/drawingml/2006/main" xmlns:r="http://schemas.openxmlformats.org/officeDocument/2006/relationships" xmlns:p="http://schemas.openxmlformats.org/presentationml/2006/main">
+  <p:cSld>
+    <p:spTree>
+      <p:nvGrpSpPr>
+        <p:cNvPr id="1" name=""/>
+        <p:cNvGrpSpPr/>
+        <p:nvPr/>
+      </p:nvGrpSpPr>
+      <p:grpSpPr>
+        <a:xfrm>
+          <a:off x="0" y="0"/>
+          <a:ext cx="0" cy="0"/>
+          <a:chOff x="0" y="0"/>
+          <a:chExt cx="0" cy="0"/>
+        </a:xfrm>
+      </p:grpSpPr>
+      <p:sp>
+        <p:nvSpPr>
+          <p:cNvPr id="2" name="Rectangle 1">
+            <a:extLst>
+              <a:ext uri="{FF2B5EF4-FFF2-40B4-BE49-F238E27FC236}">
+                <a16:creationId xmlns:a16="http://schemas.microsoft.com/office/drawing/2014/main" id="{012911BF-0042-44E1-9319-FC58988C1E09}"/>
+              </a:ext>
+            </a:extLst>
+          </p:cNvPr>
+          <p:cNvSpPr/>
+          <p:nvPr/>
+        </p:nvSpPr>
+        <p:spPr>
+          <a:xfrm>
+            <a:off x="-14535" y="193025"/>
+            <a:ext cx="943470" cy="528478"/>
+          </a:xfrm>
+          <a:prstGeom prst="rect">
+            <a:avLst/>
+          </a:prstGeom>
+          <a:noFill/>
+          <a:effectLst/>
+        </p:spPr>
+        <p:txBody>
+          <a:bodyPr wrap="square" lIns="15240" tIns="7620" rIns="15240" bIns="7620">
+            <a:spAutoFit/>
+            <a:scene3d>
+              <a:camera prst="orthographicFront"/>
+              <a:lightRig rig="harsh" dir="t"/>
+            </a:scene3d>
+            <a:sp3d prstMaterial="matte">
+              <a:contourClr>
+                <a:schemeClr val="bg1">
+                  <a:lumMod val="65000"/>
+                </a:schemeClr>
+              </a:contourClr>
+            </a:sp3d>
+          </a:bodyPr>
+          <a:lstStyle/>
+          <a:p>
+            <a:pPr algn="ctr"/>
+            <a:r>
+              <a:rPr lang="en-US" sz="3334" b="1" spc="-42" dirty="0">
+                <a:ln/>
+                <a:solidFill>
+                  <a:schemeClr val="accent1">
+                    <a:lumMod val="50000"/>
+                  </a:schemeClr>
+                </a:solidFill>
+                <a:latin typeface="Bitstream Vera Sans Mono" panose="020B0609030804020204" pitchFamily="49" charset="0"/>
+                <a:ea typeface="DejaVu Sans" panose="020B0603030804020204" pitchFamily="34" charset="0"/>
+                <a:cs typeface="DejaVu Sans" panose="020B0603030804020204" pitchFamily="34" charset="0"/>
+              </a:rPr>
+              <a:t>TIF</a:t>
+            </a:r>
+          </a:p>
+        </p:txBody>
+      </p:sp>
+    </p:spTree>
+    <p:extLst>
+      <p:ext uri="{BB962C8B-B14F-4D97-AF65-F5344CB8AC3E}">
+        <p14:creationId xmlns:p14="http://schemas.microsoft.com/office/powerpoint/2010/main" val="1625010132"/>
+      </p:ext>
+    </p:extLst>
+  </p:cSld>
+  <p:clrMapOvr>
+    <a:masterClrMapping/>
+  </p:clrMapOvr>
+</p:sld>
+</file>
+
+<file path=ppt/slides/slide12.xml><?xml version="1.0" encoding="utf-8"?>
+<p:sld xmlns:a="http://schemas.openxmlformats.org/drawingml/2006/main" xmlns:r="http://schemas.openxmlformats.org/officeDocument/2006/relationships" xmlns:p="http://schemas.openxmlformats.org/presentationml/2006/main">
+  <p:cSld>
+    <p:spTree>
+      <p:nvGrpSpPr>
+        <p:cNvPr id="1" name=""/>
+        <p:cNvGrpSpPr/>
+        <p:nvPr/>
+      </p:nvGrpSpPr>
+      <p:grpSpPr>
+        <a:xfrm>
+          <a:off x="0" y="0"/>
+          <a:ext cx="0" cy="0"/>
+          <a:chOff x="0" y="0"/>
+          <a:chExt cx="0" cy="0"/>
+        </a:xfrm>
+      </p:grpSpPr>
+      <p:sp>
+        <p:nvSpPr>
+          <p:cNvPr id="2" name="Rectangle 1">
+            <a:extLst>
+              <a:ext uri="{FF2B5EF4-FFF2-40B4-BE49-F238E27FC236}">
+                <a16:creationId xmlns:a16="http://schemas.microsoft.com/office/drawing/2014/main" id="{012911BF-0042-44E1-9319-FC58988C1E09}"/>
+              </a:ext>
+            </a:extLst>
+          </p:cNvPr>
+          <p:cNvSpPr/>
+          <p:nvPr/>
+        </p:nvSpPr>
+        <p:spPr>
+          <a:xfrm>
+            <a:off x="-14535" y="193025"/>
+            <a:ext cx="943470" cy="528478"/>
+          </a:xfrm>
+          <a:prstGeom prst="rect">
+            <a:avLst/>
+          </a:prstGeom>
+          <a:noFill/>
+          <a:effectLst/>
+        </p:spPr>
+        <p:txBody>
+          <a:bodyPr wrap="square" lIns="15240" tIns="7620" rIns="15240" bIns="7620">
+            <a:spAutoFit/>
+            <a:scene3d>
+              <a:camera prst="orthographicFront"/>
+              <a:lightRig rig="harsh" dir="t"/>
+            </a:scene3d>
+            <a:sp3d prstMaterial="matte">
+              <a:contourClr>
+                <a:schemeClr val="bg1">
+                  <a:lumMod val="65000"/>
+                </a:schemeClr>
+              </a:contourClr>
+            </a:sp3d>
+          </a:bodyPr>
+          <a:lstStyle/>
+          <a:p>
+            <a:pPr algn="ctr"/>
+            <a:r>
+              <a:rPr lang="en-US" sz="3334" b="1" spc="-42" dirty="0">
+                <a:ln/>
+                <a:solidFill>
+                  <a:schemeClr val="accent1">
+                    <a:lumMod val="50000"/>
+                  </a:schemeClr>
+                </a:solidFill>
+                <a:latin typeface="Bitstream Vera Sans Mono" panose="020B0609030804020204" pitchFamily="49" charset="0"/>
+                <a:ea typeface="DejaVu Sans" panose="020B0603030804020204" pitchFamily="34" charset="0"/>
+                <a:cs typeface="DejaVu Sans" panose="020B0603030804020204" pitchFamily="34" charset="0"/>
+              </a:rPr>
+              <a:t>S57</a:t>
+            </a:r>
+          </a:p>
+        </p:txBody>
+      </p:sp>
+    </p:spTree>
+    <p:extLst>
+      <p:ext uri="{BB962C8B-B14F-4D97-AF65-F5344CB8AC3E}">
+        <p14:creationId xmlns:p14="http://schemas.microsoft.com/office/powerpoint/2010/main" val="3325025151"/>
+      </p:ext>
+    </p:extLst>
+  </p:cSld>
+  <p:clrMapOvr>
+    <a:masterClrMapping/>
+  </p:clrMapOvr>
+</p:sld>
+</file>
+
+<file path=ppt/slides/slide13.xml><?xml version="1.0" encoding="utf-8"?>
+<p:sld xmlns:a="http://schemas.openxmlformats.org/drawingml/2006/main" xmlns:r="http://schemas.openxmlformats.org/officeDocument/2006/relationships" xmlns:p="http://schemas.openxmlformats.org/presentationml/2006/main">
+  <p:cSld>
+    <p:spTree>
+      <p:nvGrpSpPr>
+        <p:cNvPr id="1" name=""/>
+        <p:cNvGrpSpPr/>
+        <p:nvPr/>
+      </p:nvGrpSpPr>
+      <p:grpSpPr>
+        <a:xfrm>
+          <a:off x="0" y="0"/>
+          <a:ext cx="0" cy="0"/>
+          <a:chOff x="0" y="0"/>
+          <a:chExt cx="0" cy="0"/>
+        </a:xfrm>
+      </p:grpSpPr>
+      <p:sp>
+        <p:nvSpPr>
+          <p:cNvPr id="2" name="Rectangle 1">
+            <a:extLst>
+              <a:ext uri="{FF2B5EF4-FFF2-40B4-BE49-F238E27FC236}">
+                <a16:creationId xmlns:a16="http://schemas.microsoft.com/office/drawing/2014/main" id="{012911BF-0042-44E1-9319-FC58988C1E09}"/>
+              </a:ext>
+            </a:extLst>
+          </p:cNvPr>
+          <p:cNvSpPr/>
+          <p:nvPr/>
+        </p:nvSpPr>
+        <p:spPr>
+          <a:xfrm>
+            <a:off x="-14535" y="193025"/>
+            <a:ext cx="943470" cy="528478"/>
+          </a:xfrm>
+          <a:prstGeom prst="rect">
+            <a:avLst/>
+          </a:prstGeom>
+          <a:noFill/>
+          <a:effectLst/>
+        </p:spPr>
+        <p:txBody>
+          <a:bodyPr wrap="square" lIns="15240" tIns="7620" rIns="15240" bIns="7620">
+            <a:spAutoFit/>
+            <a:scene3d>
+              <a:camera prst="orthographicFront"/>
+              <a:lightRig rig="harsh" dir="t"/>
+            </a:scene3d>
+            <a:sp3d prstMaterial="matte">
+              <a:contourClr>
+                <a:schemeClr val="bg1">
+                  <a:lumMod val="65000"/>
+                </a:schemeClr>
+              </a:contourClr>
+            </a:sp3d>
+          </a:bodyPr>
+          <a:lstStyle/>
+          <a:p>
+            <a:pPr algn="ctr"/>
+            <a:r>
+              <a:rPr lang="en-US" sz="3334" b="1" spc="-42" dirty="0">
+                <a:ln/>
+                <a:solidFill>
+                  <a:schemeClr val="accent1">
+                    <a:lumMod val="50000"/>
+                  </a:schemeClr>
+                </a:solidFill>
+                <a:latin typeface="Bitstream Vera Sans Mono" panose="020B0609030804020204" pitchFamily="49" charset="0"/>
+                <a:ea typeface="DejaVu Sans" panose="020B0603030804020204" pitchFamily="34" charset="0"/>
+                <a:cs typeface="DejaVu Sans" panose="020B0603030804020204" pitchFamily="34" charset="0"/>
+              </a:rPr>
+              <a:t>DIR</a:t>
+            </a:r>
+          </a:p>
+        </p:txBody>
+      </p:sp>
+    </p:spTree>
+    <p:extLst>
+      <p:ext uri="{BB962C8B-B14F-4D97-AF65-F5344CB8AC3E}">
+        <p14:creationId xmlns:p14="http://schemas.microsoft.com/office/powerpoint/2010/main" val="2385921930"/>
+      </p:ext>
+    </p:extLst>
+  </p:cSld>
+  <p:clrMapOvr>
+    <a:masterClrMapping/>
+  </p:clrMapOvr>
+</p:sld>
+</file>
+
 <file path=ppt/slides/slide2.xml><?xml version="1.0" encoding="utf-8"?>
 <p:sld xmlns:a="http://schemas.openxmlformats.org/drawingml/2006/main" xmlns:r="http://schemas.openxmlformats.org/officeDocument/2006/relationships" xmlns:p="http://schemas.openxmlformats.org/presentationml/2006/main">
   <p:cSld>
@@ -4751,6 +5613,182 @@
     <p:extLst>
       <p:ext uri="{BB962C8B-B14F-4D97-AF65-F5344CB8AC3E}">
         <p14:creationId xmlns:p14="http://schemas.microsoft.com/office/powerpoint/2010/main" val="1817497461"/>
+      </p:ext>
+    </p:extLst>
+  </p:cSld>
+  <p:clrMapOvr>
+    <a:masterClrMapping/>
+  </p:clrMapOvr>
+</p:sld>
+</file>
+
+<file path=ppt/slides/slide8.xml><?xml version="1.0" encoding="utf-8"?>
+<p:sld xmlns:a="http://schemas.openxmlformats.org/drawingml/2006/main" xmlns:r="http://schemas.openxmlformats.org/officeDocument/2006/relationships" xmlns:p="http://schemas.openxmlformats.org/presentationml/2006/main">
+  <p:cSld>
+    <p:spTree>
+      <p:nvGrpSpPr>
+        <p:cNvPr id="1" name=""/>
+        <p:cNvGrpSpPr/>
+        <p:nvPr/>
+      </p:nvGrpSpPr>
+      <p:grpSpPr>
+        <a:xfrm>
+          <a:off x="0" y="0"/>
+          <a:ext cx="0" cy="0"/>
+          <a:chOff x="0" y="0"/>
+          <a:chExt cx="0" cy="0"/>
+        </a:xfrm>
+      </p:grpSpPr>
+      <p:sp>
+        <p:nvSpPr>
+          <p:cNvPr id="2" name="Rectangle 1">
+            <a:extLst>
+              <a:ext uri="{FF2B5EF4-FFF2-40B4-BE49-F238E27FC236}">
+                <a16:creationId xmlns:a16="http://schemas.microsoft.com/office/drawing/2014/main" id="{012911BF-0042-44E1-9319-FC58988C1E09}"/>
+              </a:ext>
+            </a:extLst>
+          </p:cNvPr>
+          <p:cNvSpPr/>
+          <p:nvPr/>
+        </p:nvSpPr>
+        <p:spPr>
+          <a:xfrm>
+            <a:off x="-14535" y="193025"/>
+            <a:ext cx="943470" cy="528478"/>
+          </a:xfrm>
+          <a:prstGeom prst="rect">
+            <a:avLst/>
+          </a:prstGeom>
+          <a:noFill/>
+          <a:effectLst/>
+        </p:spPr>
+        <p:txBody>
+          <a:bodyPr wrap="square" lIns="15240" tIns="7620" rIns="15240" bIns="7620">
+            <a:spAutoFit/>
+            <a:scene3d>
+              <a:camera prst="orthographicFront"/>
+              <a:lightRig rig="harsh" dir="t"/>
+            </a:scene3d>
+            <a:sp3d prstMaterial="matte">
+              <a:contourClr>
+                <a:schemeClr val="bg1">
+                  <a:lumMod val="65000"/>
+                </a:schemeClr>
+              </a:contourClr>
+            </a:sp3d>
+          </a:bodyPr>
+          <a:lstStyle/>
+          <a:p>
+            <a:pPr algn="ctr"/>
+            <a:r>
+              <a:rPr lang="en-US" sz="3334" b="1" spc="-42" dirty="0">
+                <a:ln/>
+                <a:solidFill>
+                  <a:schemeClr val="accent1">
+                    <a:lumMod val="50000"/>
+                  </a:schemeClr>
+                </a:solidFill>
+                <a:latin typeface="Bitstream Vera Sans Mono" panose="020B0609030804020204" pitchFamily="49" charset="0"/>
+                <a:ea typeface="DejaVu Sans" panose="020B0603030804020204" pitchFamily="34" charset="0"/>
+                <a:cs typeface="DejaVu Sans" panose="020B0603030804020204" pitchFamily="34" charset="0"/>
+              </a:rPr>
+              <a:t>CSAR</a:t>
+            </a:r>
+          </a:p>
+        </p:txBody>
+      </p:sp>
+    </p:spTree>
+    <p:extLst>
+      <p:ext uri="{BB962C8B-B14F-4D97-AF65-F5344CB8AC3E}">
+        <p14:creationId xmlns:p14="http://schemas.microsoft.com/office/powerpoint/2010/main" val="1813296000"/>
+      </p:ext>
+    </p:extLst>
+  </p:cSld>
+  <p:clrMapOvr>
+    <a:masterClrMapping/>
+  </p:clrMapOvr>
+</p:sld>
+</file>
+
+<file path=ppt/slides/slide9.xml><?xml version="1.0" encoding="utf-8"?>
+<p:sld xmlns:a="http://schemas.openxmlformats.org/drawingml/2006/main" xmlns:r="http://schemas.openxmlformats.org/officeDocument/2006/relationships" xmlns:p="http://schemas.openxmlformats.org/presentationml/2006/main">
+  <p:cSld>
+    <p:spTree>
+      <p:nvGrpSpPr>
+        <p:cNvPr id="1" name=""/>
+        <p:cNvGrpSpPr/>
+        <p:nvPr/>
+      </p:nvGrpSpPr>
+      <p:grpSpPr>
+        <a:xfrm>
+          <a:off x="0" y="0"/>
+          <a:ext cx="0" cy="0"/>
+          <a:chOff x="0" y="0"/>
+          <a:chExt cx="0" cy="0"/>
+        </a:xfrm>
+      </p:grpSpPr>
+      <p:sp>
+        <p:nvSpPr>
+          <p:cNvPr id="2" name="Rectangle 1">
+            <a:extLst>
+              <a:ext uri="{FF2B5EF4-FFF2-40B4-BE49-F238E27FC236}">
+                <a16:creationId xmlns:a16="http://schemas.microsoft.com/office/drawing/2014/main" id="{012911BF-0042-44E1-9319-FC58988C1E09}"/>
+              </a:ext>
+            </a:extLst>
+          </p:cNvPr>
+          <p:cNvSpPr/>
+          <p:nvPr/>
+        </p:nvSpPr>
+        <p:spPr>
+          <a:xfrm>
+            <a:off x="-14535" y="193025"/>
+            <a:ext cx="943470" cy="528478"/>
+          </a:xfrm>
+          <a:prstGeom prst="rect">
+            <a:avLst/>
+          </a:prstGeom>
+          <a:noFill/>
+          <a:effectLst/>
+        </p:spPr>
+        <p:txBody>
+          <a:bodyPr wrap="square" lIns="15240" tIns="7620" rIns="15240" bIns="7620">
+            <a:spAutoFit/>
+            <a:scene3d>
+              <a:camera prst="orthographicFront"/>
+              <a:lightRig rig="harsh" dir="t"/>
+            </a:scene3d>
+            <a:sp3d prstMaterial="matte">
+              <a:contourClr>
+                <a:schemeClr val="bg1">
+                  <a:lumMod val="65000"/>
+                </a:schemeClr>
+              </a:contourClr>
+            </a:sp3d>
+          </a:bodyPr>
+          <a:lstStyle/>
+          <a:p>
+            <a:pPr algn="ctr"/>
+            <a:r>
+              <a:rPr lang="en-US" sz="3334" b="1" spc="-42" dirty="0">
+                <a:ln/>
+                <a:solidFill>
+                  <a:schemeClr val="accent1">
+                    <a:lumMod val="50000"/>
+                  </a:schemeClr>
+                </a:solidFill>
+                <a:latin typeface="Bitstream Vera Sans Mono" panose="020B0609030804020204" pitchFamily="49" charset="0"/>
+                <a:ea typeface="DejaVu Sans" panose="020B0603030804020204" pitchFamily="34" charset="0"/>
+                <a:cs typeface="DejaVu Sans" panose="020B0603030804020204" pitchFamily="34" charset="0"/>
+              </a:rPr>
+              <a:t>JSON</a:t>
+            </a:r>
+          </a:p>
+        </p:txBody>
+      </p:sp>
+    </p:spTree>
+    <p:extLst>
+      <p:ext uri="{BB962C8B-B14F-4D97-AF65-F5344CB8AC3E}">
+        <p14:creationId xmlns:p14="http://schemas.microsoft.com/office/powerpoint/2010/main" val="1090772778"/>
       </p:ext>
     </p:extLst>
   </p:cSld>

</xml_diff>

<commit_message>
added raw and enc inputs to the main tab
</commit_message>
<xml_diff>
--- a/resources/icons.pptx
+++ b/resources/icons.pptx
@@ -5,7 +5,7 @@
     <p:sldMasterId id="2147483684" r:id="rId1"/>
   </p:sldMasterIdLst>
   <p:notesMasterIdLst>
-    <p:notesMasterId r:id="rId15"/>
+    <p:notesMasterId r:id="rId16"/>
   </p:notesMasterIdLst>
   <p:sldIdLst>
     <p:sldId id="597" r:id="rId2"/>
@@ -20,7 +20,8 @@
     <p:sldId id="595" r:id="rId11"/>
     <p:sldId id="601" r:id="rId12"/>
     <p:sldId id="596" r:id="rId13"/>
-    <p:sldId id="602" r:id="rId14"/>
+    <p:sldId id="604" r:id="rId14"/>
+    <p:sldId id="602" r:id="rId15"/>
   </p:sldIdLst>
   <p:sldSz cx="914400" cy="914400"/>
   <p:notesSz cx="6858000" cy="9144000"/>
@@ -209,7 +210,7 @@
           <a:p>
             <a:fld id="{173FD435-C119-4590-9D53-7CAF83F19020}" type="datetimeFigureOut">
               <a:rPr lang="en-US" smtClean="0"/>
-              <a:t>7/4/2019</a:t>
+              <a:t>7/5/2019</a:t>
             </a:fld>
             <a:endParaRPr lang="en-US"/>
           </a:p>
@@ -1054,6 +1055,90 @@
     </p:spTree>
     <p:extLst>
       <p:ext uri="{BB962C8B-B14F-4D97-AF65-F5344CB8AC3E}">
+        <p14:creationId xmlns:p14="http://schemas.microsoft.com/office/powerpoint/2010/main" val="304859223"/>
+      </p:ext>
+    </p:extLst>
+  </p:cSld>
+  <p:clrMapOvr>
+    <a:masterClrMapping/>
+  </p:clrMapOvr>
+</p:notes>
+</file>
+
+<file path=ppt/notesSlides/notesSlide8.xml><?xml version="1.0" encoding="utf-8"?>
+<p:notes xmlns:a="http://schemas.openxmlformats.org/drawingml/2006/main" xmlns:r="http://schemas.openxmlformats.org/officeDocument/2006/relationships" xmlns:p="http://schemas.openxmlformats.org/presentationml/2006/main">
+  <p:cSld>
+    <p:spTree>
+      <p:nvGrpSpPr>
+        <p:cNvPr id="1" name=""/>
+        <p:cNvGrpSpPr/>
+        <p:nvPr/>
+      </p:nvGrpSpPr>
+      <p:grpSpPr>
+        <a:xfrm>
+          <a:off x="0" y="0"/>
+          <a:ext cx="0" cy="0"/>
+          <a:chOff x="0" y="0"/>
+          <a:chExt cx="0" cy="0"/>
+        </a:xfrm>
+      </p:grpSpPr>
+      <p:sp>
+        <p:nvSpPr>
+          <p:cNvPr id="2" name="Slide Image Placeholder 1"/>
+          <p:cNvSpPr>
+            <a:spLocks noGrp="1" noRot="1" noChangeAspect="1"/>
+          </p:cNvSpPr>
+          <p:nvPr>
+            <p:ph type="sldImg"/>
+          </p:nvPr>
+        </p:nvSpPr>
+        <p:spPr/>
+      </p:sp>
+      <p:sp>
+        <p:nvSpPr>
+          <p:cNvPr id="3" name="Notes Placeholder 2"/>
+          <p:cNvSpPr>
+            <a:spLocks noGrp="1"/>
+          </p:cNvSpPr>
+          <p:nvPr>
+            <p:ph type="body" idx="1"/>
+          </p:nvPr>
+        </p:nvSpPr>
+        <p:spPr/>
+        <p:txBody>
+          <a:bodyPr/>
+          <a:lstStyle/>
+          <a:p>
+            <a:endParaRPr lang="en-US" dirty="0"/>
+          </a:p>
+        </p:txBody>
+      </p:sp>
+      <p:sp>
+        <p:nvSpPr>
+          <p:cNvPr id="4" name="Slide Number Placeholder 3"/>
+          <p:cNvSpPr>
+            <a:spLocks noGrp="1"/>
+          </p:cNvSpPr>
+          <p:nvPr>
+            <p:ph type="sldNum" sz="quarter" idx="5"/>
+          </p:nvPr>
+        </p:nvSpPr>
+        <p:spPr/>
+        <p:txBody>
+          <a:bodyPr/>
+          <a:lstStyle/>
+          <a:p>
+            <a:fld id="{EE6CE23A-BB01-46B4-BDD6-2DE3EFA83C70}" type="slidenum">
+              <a:rPr lang="en-US" smtClean="0"/>
+              <a:t>14</a:t>
+            </a:fld>
+            <a:endParaRPr lang="en-US"/>
+          </a:p>
+        </p:txBody>
+      </p:sp>
+    </p:spTree>
+    <p:extLst>
+      <p:ext uri="{BB962C8B-B14F-4D97-AF65-F5344CB8AC3E}">
         <p14:creationId xmlns:p14="http://schemas.microsoft.com/office/powerpoint/2010/main" val="1993168581"/>
       </p:ext>
     </p:extLst>
@@ -1195,7 +1280,7 @@
           <a:p>
             <a:fld id="{D296FE55-24A0-4405-87BA-F203EB2AA989}" type="datetimeFigureOut">
               <a:rPr lang="en-US" smtClean="0"/>
-              <a:t>7/4/2019</a:t>
+              <a:t>7/5/2019</a:t>
             </a:fld>
             <a:endParaRPr lang="en-US"/>
           </a:p>
@@ -1365,7 +1450,7 @@
           <a:p>
             <a:fld id="{D296FE55-24A0-4405-87BA-F203EB2AA989}" type="datetimeFigureOut">
               <a:rPr lang="en-US" smtClean="0"/>
-              <a:t>7/4/2019</a:t>
+              <a:t>7/5/2019</a:t>
             </a:fld>
             <a:endParaRPr lang="en-US"/>
           </a:p>
@@ -1545,7 +1630,7 @@
           <a:p>
             <a:fld id="{D296FE55-24A0-4405-87BA-F203EB2AA989}" type="datetimeFigureOut">
               <a:rPr lang="en-US" smtClean="0"/>
-              <a:t>7/4/2019</a:t>
+              <a:t>7/5/2019</a:t>
             </a:fld>
             <a:endParaRPr lang="en-US"/>
           </a:p>
@@ -1715,7 +1800,7 @@
           <a:p>
             <a:fld id="{D296FE55-24A0-4405-87BA-F203EB2AA989}" type="datetimeFigureOut">
               <a:rPr lang="en-US" smtClean="0"/>
-              <a:t>7/4/2019</a:t>
+              <a:t>7/5/2019</a:t>
             </a:fld>
             <a:endParaRPr lang="en-US"/>
           </a:p>
@@ -1959,7 +2044,7 @@
           <a:p>
             <a:fld id="{D296FE55-24A0-4405-87BA-F203EB2AA989}" type="datetimeFigureOut">
               <a:rPr lang="en-US" smtClean="0"/>
-              <a:t>7/4/2019</a:t>
+              <a:t>7/5/2019</a:t>
             </a:fld>
             <a:endParaRPr lang="en-US"/>
           </a:p>
@@ -2191,7 +2276,7 @@
           <a:p>
             <a:fld id="{D296FE55-24A0-4405-87BA-F203EB2AA989}" type="datetimeFigureOut">
               <a:rPr lang="en-US" smtClean="0"/>
-              <a:t>7/4/2019</a:t>
+              <a:t>7/5/2019</a:t>
             </a:fld>
             <a:endParaRPr lang="en-US"/>
           </a:p>
@@ -2558,7 +2643,7 @@
           <a:p>
             <a:fld id="{D296FE55-24A0-4405-87BA-F203EB2AA989}" type="datetimeFigureOut">
               <a:rPr lang="en-US" smtClean="0"/>
-              <a:t>7/4/2019</a:t>
+              <a:t>7/5/2019</a:t>
             </a:fld>
             <a:endParaRPr lang="en-US"/>
           </a:p>
@@ -2676,7 +2761,7 @@
           <a:p>
             <a:fld id="{D296FE55-24A0-4405-87BA-F203EB2AA989}" type="datetimeFigureOut">
               <a:rPr lang="en-US" smtClean="0"/>
-              <a:t>7/4/2019</a:t>
+              <a:t>7/5/2019</a:t>
             </a:fld>
             <a:endParaRPr lang="en-US"/>
           </a:p>
@@ -2771,7 +2856,7 @@
           <a:p>
             <a:fld id="{D296FE55-24A0-4405-87BA-F203EB2AA989}" type="datetimeFigureOut">
               <a:rPr lang="en-US" smtClean="0"/>
-              <a:t>7/4/2019</a:t>
+              <a:t>7/5/2019</a:t>
             </a:fld>
             <a:endParaRPr lang="en-US"/>
           </a:p>
@@ -3048,7 +3133,7 @@
           <a:p>
             <a:fld id="{D296FE55-24A0-4405-87BA-F203EB2AA989}" type="datetimeFigureOut">
               <a:rPr lang="en-US" smtClean="0"/>
-              <a:t>7/4/2019</a:t>
+              <a:t>7/5/2019</a:t>
             </a:fld>
             <a:endParaRPr lang="en-US"/>
           </a:p>
@@ -3305,7 +3390,7 @@
           <a:p>
             <a:fld id="{D296FE55-24A0-4405-87BA-F203EB2AA989}" type="datetimeFigureOut">
               <a:rPr lang="en-US" smtClean="0"/>
-              <a:t>7/4/2019</a:t>
+              <a:t>7/5/2019</a:t>
             </a:fld>
             <a:endParaRPr lang="en-US"/>
           </a:p>
@@ -3518,7 +3603,7 @@
           <a:p>
             <a:fld id="{D296FE55-24A0-4405-87BA-F203EB2AA989}" type="datetimeFigureOut">
               <a:rPr lang="en-US" smtClean="0"/>
-              <a:t>7/4/2019</a:t>
+              <a:t>7/5/2019</a:t>
             </a:fld>
             <a:endParaRPr lang="en-US"/>
           </a:p>
@@ -4572,6 +4657,94 @@
                 <a:ea typeface="DejaVu Sans" panose="020B0603030804020204" pitchFamily="34" charset="0"/>
                 <a:cs typeface="DejaVu Sans" panose="020B0603030804020204" pitchFamily="34" charset="0"/>
               </a:rPr>
+              <a:t>KNG</a:t>
+            </a:r>
+          </a:p>
+        </p:txBody>
+      </p:sp>
+    </p:spTree>
+    <p:extLst>
+      <p:ext uri="{BB962C8B-B14F-4D97-AF65-F5344CB8AC3E}">
+        <p14:creationId xmlns:p14="http://schemas.microsoft.com/office/powerpoint/2010/main" val="292639894"/>
+      </p:ext>
+    </p:extLst>
+  </p:cSld>
+  <p:clrMapOvr>
+    <a:masterClrMapping/>
+  </p:clrMapOvr>
+</p:sld>
+</file>
+
+<file path=ppt/slides/slide14.xml><?xml version="1.0" encoding="utf-8"?>
+<p:sld xmlns:a="http://schemas.openxmlformats.org/drawingml/2006/main" xmlns:r="http://schemas.openxmlformats.org/officeDocument/2006/relationships" xmlns:p="http://schemas.openxmlformats.org/presentationml/2006/main">
+  <p:cSld>
+    <p:spTree>
+      <p:nvGrpSpPr>
+        <p:cNvPr id="1" name=""/>
+        <p:cNvGrpSpPr/>
+        <p:nvPr/>
+      </p:nvGrpSpPr>
+      <p:grpSpPr>
+        <a:xfrm>
+          <a:off x="0" y="0"/>
+          <a:ext cx="0" cy="0"/>
+          <a:chOff x="0" y="0"/>
+          <a:chExt cx="0" cy="0"/>
+        </a:xfrm>
+      </p:grpSpPr>
+      <p:sp>
+        <p:nvSpPr>
+          <p:cNvPr id="2" name="Rectangle 1">
+            <a:extLst>
+              <a:ext uri="{FF2B5EF4-FFF2-40B4-BE49-F238E27FC236}">
+                <a16:creationId xmlns:a16="http://schemas.microsoft.com/office/drawing/2014/main" id="{012911BF-0042-44E1-9319-FC58988C1E09}"/>
+              </a:ext>
+            </a:extLst>
+          </p:cNvPr>
+          <p:cNvSpPr/>
+          <p:nvPr/>
+        </p:nvSpPr>
+        <p:spPr>
+          <a:xfrm>
+            <a:off x="-14535" y="193025"/>
+            <a:ext cx="943470" cy="528478"/>
+          </a:xfrm>
+          <a:prstGeom prst="rect">
+            <a:avLst/>
+          </a:prstGeom>
+          <a:noFill/>
+          <a:effectLst/>
+        </p:spPr>
+        <p:txBody>
+          <a:bodyPr wrap="square" lIns="15240" tIns="7620" rIns="15240" bIns="7620">
+            <a:spAutoFit/>
+            <a:scene3d>
+              <a:camera prst="orthographicFront"/>
+              <a:lightRig rig="harsh" dir="t"/>
+            </a:scene3d>
+            <a:sp3d prstMaterial="matte">
+              <a:contourClr>
+                <a:schemeClr val="bg1">
+                  <a:lumMod val="65000"/>
+                </a:schemeClr>
+              </a:contourClr>
+            </a:sp3d>
+          </a:bodyPr>
+          <a:lstStyle/>
+          <a:p>
+            <a:pPr algn="ctr"/>
+            <a:r>
+              <a:rPr lang="en-US" sz="3334" b="1" spc="-42" dirty="0">
+                <a:ln/>
+                <a:solidFill>
+                  <a:schemeClr val="accent1">
+                    <a:lumMod val="50000"/>
+                  </a:schemeClr>
+                </a:solidFill>
+                <a:latin typeface="Bitstream Vera Sans Mono" panose="020B0609030804020204" pitchFamily="49" charset="0"/>
+                <a:ea typeface="DejaVu Sans" panose="020B0603030804020204" pitchFamily="34" charset="0"/>
+                <a:cs typeface="DejaVu Sans" panose="020B0603030804020204" pitchFamily="34" charset="0"/>
+              </a:rPr>
               <a:t>DIR</a:t>
             </a:r>
           </a:p>

</xml_diff>